<commit_message>
Fix slide navigation scroll to show page title
- Changed scroll target from slideshow container to main element
- Now scrolls all the way to top of page including title on next/previous
- Updated all 4 slide pages: methodology, agentic-coding, findings, network-sense

🤖 Generated with Claude Code

Co-Authored-By: Claude <noreply@anthropic.com>
</commit_message>
<xml_diff>
--- a/assets/previews/.previewtemplate.pptx
+++ b/assets/previews/.previewtemplate.pptx
@@ -108,6 +108,11 @@
       </a:defRPr>
     </a:lvl9pPr>
   </p:defaultTextStyle>
+  <p:extLst>
+    <p:ext uri="{EFAFB233-063F-42B5-8137-9DF3F51BA10A}">
+      <p15:sldGuideLst xmlns:p15="http://schemas.microsoft.com/office/powerpoint/2012/main"/>
+    </p:ext>
+  </p:extLst>
 </p:presentation>
 </file>
 
@@ -242,7 +247,7 @@
           <a:p>
             <a:fld id="{EDF3D6AA-1A24-4623-8276-359C05C6679F}" type="datetimeFigureOut">
               <a:rPr lang="en-US" smtClean="0"/>
-              <a:t>11/2/2025</a:t>
+              <a:t>11/3/2025</a:t>
             </a:fld>
             <a:endParaRPr lang="en-US"/>
           </a:p>
@@ -412,7 +417,7 @@
           <a:p>
             <a:fld id="{EDF3D6AA-1A24-4623-8276-359C05C6679F}" type="datetimeFigureOut">
               <a:rPr lang="en-US" smtClean="0"/>
-              <a:t>11/2/2025</a:t>
+              <a:t>11/3/2025</a:t>
             </a:fld>
             <a:endParaRPr lang="en-US"/>
           </a:p>
@@ -592,7 +597,7 @@
           <a:p>
             <a:fld id="{EDF3D6AA-1A24-4623-8276-359C05C6679F}" type="datetimeFigureOut">
               <a:rPr lang="en-US" smtClean="0"/>
-              <a:t>11/2/2025</a:t>
+              <a:t>11/3/2025</a:t>
             </a:fld>
             <a:endParaRPr lang="en-US"/>
           </a:p>
@@ -762,7 +767,7 @@
           <a:p>
             <a:fld id="{EDF3D6AA-1A24-4623-8276-359C05C6679F}" type="datetimeFigureOut">
               <a:rPr lang="en-US" smtClean="0"/>
-              <a:t>11/2/2025</a:t>
+              <a:t>11/3/2025</a:t>
             </a:fld>
             <a:endParaRPr lang="en-US"/>
           </a:p>
@@ -1008,7 +1013,7 @@
           <a:p>
             <a:fld id="{EDF3D6AA-1A24-4623-8276-359C05C6679F}" type="datetimeFigureOut">
               <a:rPr lang="en-US" smtClean="0"/>
-              <a:t>11/2/2025</a:t>
+              <a:t>11/3/2025</a:t>
             </a:fld>
             <a:endParaRPr lang="en-US"/>
           </a:p>
@@ -1240,7 +1245,7 @@
           <a:p>
             <a:fld id="{EDF3D6AA-1A24-4623-8276-359C05C6679F}" type="datetimeFigureOut">
               <a:rPr lang="en-US" smtClean="0"/>
-              <a:t>11/2/2025</a:t>
+              <a:t>11/3/2025</a:t>
             </a:fld>
             <a:endParaRPr lang="en-US"/>
           </a:p>
@@ -1607,7 +1612,7 @@
           <a:p>
             <a:fld id="{EDF3D6AA-1A24-4623-8276-359C05C6679F}" type="datetimeFigureOut">
               <a:rPr lang="en-US" smtClean="0"/>
-              <a:t>11/2/2025</a:t>
+              <a:t>11/3/2025</a:t>
             </a:fld>
             <a:endParaRPr lang="en-US"/>
           </a:p>
@@ -1725,7 +1730,7 @@
           <a:p>
             <a:fld id="{EDF3D6AA-1A24-4623-8276-359C05C6679F}" type="datetimeFigureOut">
               <a:rPr lang="en-US" smtClean="0"/>
-              <a:t>11/2/2025</a:t>
+              <a:t>11/3/2025</a:t>
             </a:fld>
             <a:endParaRPr lang="en-US"/>
           </a:p>
@@ -1820,7 +1825,7 @@
           <a:p>
             <a:fld id="{EDF3D6AA-1A24-4623-8276-359C05C6679F}" type="datetimeFigureOut">
               <a:rPr lang="en-US" smtClean="0"/>
-              <a:t>11/2/2025</a:t>
+              <a:t>11/3/2025</a:t>
             </a:fld>
             <a:endParaRPr lang="en-US"/>
           </a:p>
@@ -2097,7 +2102,7 @@
           <a:p>
             <a:fld id="{EDF3D6AA-1A24-4623-8276-359C05C6679F}" type="datetimeFigureOut">
               <a:rPr lang="en-US" smtClean="0"/>
-              <a:t>11/2/2025</a:t>
+              <a:t>11/3/2025</a:t>
             </a:fld>
             <a:endParaRPr lang="en-US"/>
           </a:p>
@@ -2354,7 +2359,7 @@
           <a:p>
             <a:fld id="{EDF3D6AA-1A24-4623-8276-359C05C6679F}" type="datetimeFigureOut">
               <a:rPr lang="en-US" smtClean="0"/>
-              <a:t>11/2/2025</a:t>
+              <a:t>11/3/2025</a:t>
             </a:fld>
             <a:endParaRPr lang="en-US"/>
           </a:p>
@@ -2567,7 +2572,7 @@
           <a:p>
             <a:fld id="{EDF3D6AA-1A24-4623-8276-359C05C6679F}" type="datetimeFigureOut">
               <a:rPr lang="en-US" smtClean="0"/>
-              <a:t>11/2/2025</a:t>
+              <a:t>11/3/2025</a:t>
             </a:fld>
             <a:endParaRPr lang="en-US"/>
           </a:p>
@@ -2972,6 +2977,37 @@
           <a:chExt cx="0" cy="0"/>
         </a:xfrm>
       </p:grpSpPr>
+      <p:pic>
+        <p:nvPicPr>
+          <p:cNvPr id="3" name="Picture 2">
+            <a:extLst>
+              <a:ext uri="{FF2B5EF4-FFF2-40B4-BE49-F238E27FC236}">
+                <a16:creationId xmlns:a16="http://schemas.microsoft.com/office/drawing/2014/main" id="{B44AE278-8DF4-DE14-932E-DC0035F84C0B}"/>
+              </a:ext>
+            </a:extLst>
+          </p:cNvPr>
+          <p:cNvPicPr>
+            <a:picLocks noChangeAspect="1"/>
+          </p:cNvPicPr>
+          <p:nvPr/>
+        </p:nvPicPr>
+        <p:blipFill>
+          <a:blip r:embed="rId2"/>
+          <a:srcRect b="31841"/>
+          <a:stretch>
+            <a:fillRect/>
+          </a:stretch>
+        </p:blipFill>
+        <p:spPr>
+          <a:xfrm>
+            <a:off x="0" y="0"/>
+            <a:ext cx="9525000" cy="4781550"/>
+          </a:xfrm>
+          <a:prstGeom prst="rect">
+            <a:avLst/>
+          </a:prstGeom>
+        </p:spPr>
+      </p:pic>
     </p:spTree>
     <p:extLst>
       <p:ext uri="{BB962C8B-B14F-4D97-AF65-F5344CB8AC3E}">

</xml_diff>